<commit_message>
change in 2-day. Add 'setting up the env'
</commit_message>
<xml_diff>
--- a/1-Day/ansible-day1.pptx
+++ b/1-Day/ansible-day1.pptx
@@ -209,7 +209,7 @@
             <a:fld id="{4DB62DA6-9F0D-4D1A-BA58-A16CF5D583BC}" type="datetimeFigureOut">
               <a:rPr lang="en-US" smtClean="0"/>
               <a:pPr/>
-              <a:t>6/18/2020</a:t>
+              <a:t>6/23/2020</a:t>
             </a:fld>
             <a:endParaRPr lang="en-US"/>
           </a:p>
@@ -372,7 +372,7 @@
             <a:fld id="{3E0ECC1A-6F08-4C6E-9F48-A2BB9CB0C50D}" type="datetimeFigureOut">
               <a:rPr lang="en-US" smtClean="0"/>
               <a:pPr/>
-              <a:t>6/18/2020</a:t>
+              <a:t>6/23/2020</a:t>
             </a:fld>
             <a:endParaRPr lang="en-US"/>
           </a:p>
@@ -878,7 +878,7 @@
             <a:fld id="{E964EBC9-CD3B-4C50-8EC1-49E1A1D58D9B}" type="datetime1">
               <a:rPr lang="en-US" smtClean="0"/>
               <a:pPr/>
-              <a:t>6/18/2020</a:t>
+              <a:t>6/23/2020</a:t>
             </a:fld>
             <a:endParaRPr lang="en-US"/>
           </a:p>
@@ -1753,7 +1753,7 @@
             <a:fld id="{3A0D26ED-8899-45B8-B9A2-5F7E705B260A}" type="datetime1">
               <a:rPr lang="en-US" smtClean="0"/>
               <a:pPr/>
-              <a:t>6/18/2020</a:t>
+              <a:t>6/23/2020</a:t>
             </a:fld>
             <a:endParaRPr lang="en-US"/>
           </a:p>
@@ -1934,7 +1934,7 @@
             <a:fld id="{34398A4D-53CC-483E-96BE-B6281DC3DF92}" type="datetime1">
               <a:rPr lang="en-US" smtClean="0"/>
               <a:pPr/>
-              <a:t>6/18/2020</a:t>
+              <a:t>6/23/2020</a:t>
             </a:fld>
             <a:endParaRPr lang="en-US"/>
           </a:p>
@@ -2110,7 +2110,7 @@
             <a:fld id="{86678DB6-9FA8-4164-8332-A883D8F2C54D}" type="datetime1">
               <a:rPr lang="en-US" smtClean="0"/>
               <a:pPr/>
-              <a:t>6/18/2020</a:t>
+              <a:t>6/23/2020</a:t>
             </a:fld>
             <a:endParaRPr lang="en-US"/>
           </a:p>
@@ -2326,7 +2326,7 @@
             <a:fld id="{21CEE656-E7A1-4379-B7B8-3DBDE2CC6CC9}" type="datetime1">
               <a:rPr lang="en-US" smtClean="0"/>
               <a:pPr/>
-              <a:t>6/18/2020</a:t>
+              <a:t>6/23/2020</a:t>
             </a:fld>
             <a:endParaRPr lang="en-US"/>
           </a:p>
@@ -3146,7 +3146,7 @@
             <a:fld id="{98B85172-7C0D-4B70-B863-7CAA34B8AF30}" type="datetime1">
               <a:rPr lang="en-US" smtClean="0"/>
               <a:pPr/>
-              <a:t>6/18/2020</a:t>
+              <a:t>6/23/2020</a:t>
             </a:fld>
             <a:endParaRPr lang="en-US"/>
           </a:p>
@@ -3388,7 +3388,7 @@
             <a:fld id="{0C01A826-6846-42E7-886A-5929E847939D}" type="datetime1">
               <a:rPr lang="en-US" smtClean="0"/>
               <a:pPr/>
-              <a:t>6/18/2020</a:t>
+              <a:t>6/23/2020</a:t>
             </a:fld>
             <a:endParaRPr lang="en-US"/>
           </a:p>
@@ -3717,7 +3717,7 @@
             <a:fld id="{CDB64610-4423-4196-BE76-CD68EBCED184}" type="datetime1">
               <a:rPr lang="en-US" smtClean="0"/>
               <a:pPr/>
-              <a:t>6/18/2020</a:t>
+              <a:t>6/23/2020</a:t>
             </a:fld>
             <a:endParaRPr lang="en-US"/>
           </a:p>
@@ -3813,7 +3813,7 @@
             <a:fld id="{8DC76AF3-6F12-4313-A487-9F3495470CE7}" type="datetime1">
               <a:rPr lang="en-US" smtClean="0"/>
               <a:pPr/>
-              <a:t>6/18/2020</a:t>
+              <a:t>6/23/2020</a:t>
             </a:fld>
             <a:endParaRPr lang="en-US"/>
           </a:p>
@@ -4336,7 +4336,7 @@
             <a:fld id="{E67C1E6D-30C8-412D-A086-ED005AE948E8}" type="datetime1">
               <a:rPr lang="en-US" smtClean="0"/>
               <a:pPr/>
-              <a:t>6/18/2020</a:t>
+              <a:t>6/23/2020</a:t>
             </a:fld>
             <a:endParaRPr lang="en-US"/>
           </a:p>
@@ -4853,7 +4853,7 @@
             <a:fld id="{61ACC9AA-536C-4747-B325-B5E3A9016B33}" type="datetime1">
               <a:rPr lang="en-US" smtClean="0"/>
               <a:pPr/>
-              <a:t>6/18/2020</a:t>
+              <a:t>6/23/2020</a:t>
             </a:fld>
             <a:endParaRPr lang="en-US"/>
           </a:p>
@@ -5104,7 +5104,7 @@
             <a:fld id="{C3AC4B96-5F5E-4B9F-A46B-93F104CE0A15}" type="datetime1">
               <a:rPr lang="en-US" smtClean="0"/>
               <a:pPr/>
-              <a:t>6/18/2020</a:t>
+              <a:t>6/23/2020</a:t>
             </a:fld>
             <a:endParaRPr lang="en-US"/>
           </a:p>
@@ -5839,6 +5839,13 @@
   <p:clrMapOvr>
     <a:masterClrMapping/>
   </p:clrMapOvr>
+  <p:timing>
+    <p:tnLst>
+      <p:par>
+        <p:cTn id="1" dur="indefinite" restart="never" nodeType="tmRoot"/>
+      </p:par>
+    </p:tnLst>
+  </p:timing>
 </p:sld>
 </file>
 
@@ -5957,7 +5964,7 @@
         </p:blipFill>
         <p:spPr bwMode="auto">
           <a:xfrm>
-            <a:off x="500034" y="1500174"/>
+            <a:off x="500034" y="1357298"/>
             <a:ext cx="7429552" cy="4714908"/>
           </a:xfrm>
           <a:prstGeom prst="rect">
@@ -5978,6 +5985,13 @@
   <p:clrMapOvr>
     <a:masterClrMapping/>
   </p:clrMapOvr>
+  <p:timing>
+    <p:tnLst>
+      <p:par>
+        <p:cTn id="1" dur="indefinite" restart="never" nodeType="tmRoot"/>
+      </p:par>
+    </p:tnLst>
+  </p:timing>
 </p:sld>
 </file>
 
@@ -6109,6 +6123,13 @@
   <p:clrMapOvr>
     <a:masterClrMapping/>
   </p:clrMapOvr>
+  <p:timing>
+    <p:tnLst>
+      <p:par>
+        <p:cTn id="1" dur="indefinite" restart="never" nodeType="tmRoot"/>
+      </p:par>
+    </p:tnLst>
+  </p:timing>
 </p:sld>
 </file>
 
@@ -6248,6 +6269,13 @@
   <p:clrMapOvr>
     <a:masterClrMapping/>
   </p:clrMapOvr>
+  <p:timing>
+    <p:tnLst>
+      <p:par>
+        <p:cTn id="1" dur="indefinite" restart="never" nodeType="tmRoot"/>
+      </p:par>
+    </p:tnLst>
+  </p:timing>
 </p:sld>
 </file>
 
@@ -6295,7 +6323,7 @@
                   <a:schemeClr val="tx1"/>
                 </a:solidFill>
               </a:rPr>
-              <a:t>DEMO AND Q&amp;A</a:t>
+              <a:t>Q&amp;A</a:t>
             </a:r>
             <a:endParaRPr lang="en-US" dirty="0">
               <a:solidFill>
@@ -6357,6 +6385,13 @@
   <p:clrMapOvr>
     <a:masterClrMapping/>
   </p:clrMapOvr>
+  <p:timing>
+    <p:tnLst>
+      <p:par>
+        <p:cTn id="1" dur="indefinite" restart="never" nodeType="tmRoot"/>
+      </p:par>
+    </p:tnLst>
+  </p:timing>
 </p:sld>
 </file>
 
@@ -6466,6 +6501,13 @@
   <p:clrMapOvr>
     <a:masterClrMapping/>
   </p:clrMapOvr>
+  <p:timing>
+    <p:tnLst>
+      <p:par>
+        <p:cTn id="1" dur="indefinite" restart="never" nodeType="tmRoot"/>
+      </p:par>
+    </p:tnLst>
+  </p:timing>
 </p:sld>
 </file>
 
@@ -6606,22 +6648,13 @@
           </a:p>
           <a:p>
             <a:r>
-              <a:rPr lang="en-IN" dirty="0" smtClean="0">
+              <a:rPr lang="en-IN" smtClean="0">
                 <a:latin typeface="Times New Roman" pitchFamily="18" charset="0"/>
                 <a:cs typeface="Times New Roman" pitchFamily="18" charset="0"/>
               </a:rPr>
               <a:t>Q&amp;A</a:t>
             </a:r>
-          </a:p>
-          <a:p>
-            <a:r>
-              <a:rPr lang="en-IN" dirty="0" smtClean="0">
-                <a:latin typeface="Times New Roman" pitchFamily="18" charset="0"/>
-                <a:cs typeface="Times New Roman" pitchFamily="18" charset="0"/>
-              </a:rPr>
-              <a:t>Demo</a:t>
-            </a:r>
-            <a:endParaRPr lang="en-US" dirty="0">
+            <a:endParaRPr lang="en-IN" dirty="0" smtClean="0">
               <a:latin typeface="Times New Roman" pitchFamily="18" charset="0"/>
               <a:cs typeface="Times New Roman" pitchFamily="18" charset="0"/>
             </a:endParaRPr>
@@ -6680,6 +6713,13 @@
   <p:clrMapOvr>
     <a:masterClrMapping/>
   </p:clrMapOvr>
+  <p:timing>
+    <p:tnLst>
+      <p:par>
+        <p:cTn id="1" dur="indefinite" restart="never" nodeType="tmRoot"/>
+      </p:par>
+    </p:tnLst>
+  </p:timing>
 </p:sld>
 </file>
 
@@ -6722,31 +6762,7 @@
                   <a:schemeClr val="tx1"/>
                 </a:solidFill>
               </a:rPr>
-              <a:t>What is </a:t>
-            </a:r>
-            <a:r>
-              <a:rPr lang="en-IN" dirty="0" smtClean="0">
-                <a:solidFill>
-                  <a:schemeClr val="tx1"/>
-                </a:solidFill>
-              </a:rPr>
-              <a:t>A</a:t>
-            </a:r>
-            <a:r>
-              <a:rPr lang="en-IN" dirty="0" smtClean="0">
-                <a:solidFill>
-                  <a:schemeClr val="tx1"/>
-                </a:solidFill>
-              </a:rPr>
-              <a:t>nsible</a:t>
-            </a:r>
-            <a:r>
-              <a:rPr lang="en-IN" dirty="0" smtClean="0">
-                <a:solidFill>
-                  <a:schemeClr val="tx1"/>
-                </a:solidFill>
-              </a:rPr>
-              <a:t>?</a:t>
+              <a:t>What is Ansible?</a:t>
             </a:r>
             <a:endParaRPr lang="en-US" dirty="0">
               <a:solidFill>
@@ -6782,26 +6798,8 @@
                 <a:latin typeface="Times New Roman" pitchFamily="18" charset="0"/>
                 <a:cs typeface="Times New Roman" pitchFamily="18" charset="0"/>
               </a:rPr>
-              <a:t>Ansible is an simple open-source IT Automation </a:t>
-            </a:r>
-            <a:r>
-              <a:rPr lang="en-US" dirty="0" smtClean="0">
-                <a:latin typeface="Times New Roman" pitchFamily="18" charset="0"/>
-                <a:cs typeface="Times New Roman" pitchFamily="18" charset="0"/>
-              </a:rPr>
-              <a:t>tool. </a:t>
-            </a:r>
-            <a:r>
-              <a:rPr lang="en-US" dirty="0" smtClean="0">
-                <a:latin typeface="Times New Roman" pitchFamily="18" charset="0"/>
-                <a:cs typeface="Times New Roman" pitchFamily="18" charset="0"/>
-              </a:rPr>
-              <a:t>Used to automate infrastructure.</a:t>
-            </a:r>
-            <a:endParaRPr lang="en-US" dirty="0" smtClean="0">
-              <a:latin typeface="Times New Roman" pitchFamily="18" charset="0"/>
-              <a:cs typeface="Times New Roman" pitchFamily="18" charset="0"/>
-            </a:endParaRPr>
+              <a:t>Ansible is an simple open-source IT Automation tool. Used to automate infrastructure.</a:t>
+            </a:r>
           </a:p>
           <a:p>
             <a:pPr>
@@ -6818,7 +6816,21 @@
                 <a:latin typeface="Times New Roman" pitchFamily="18" charset="0"/>
                 <a:cs typeface="Times New Roman" pitchFamily="18" charset="0"/>
               </a:rPr>
-              <a:t>It uses SSH to connect to remove device and run the configured Tasks.</a:t>
+              <a:t>It uses SSH to connect to </a:t>
+            </a:r>
+            <a:r>
+              <a:rPr lang="en-US" dirty="0" smtClean="0">
+                <a:latin typeface="Times New Roman" pitchFamily="18" charset="0"/>
+                <a:cs typeface="Times New Roman" pitchFamily="18" charset="0"/>
+              </a:rPr>
+              <a:t>device </a:t>
+            </a:r>
+            <a:r>
+              <a:rPr lang="en-US" dirty="0" smtClean="0">
+                <a:latin typeface="Times New Roman" pitchFamily="18" charset="0"/>
+                <a:cs typeface="Times New Roman" pitchFamily="18" charset="0"/>
+              </a:rPr>
+              <a:t>and run the configured Tasks.</a:t>
             </a:r>
           </a:p>
           <a:p>
@@ -6881,6 +6893,13 @@
   <p:clrMapOvr>
     <a:masterClrMapping/>
   </p:clrMapOvr>
+  <p:timing>
+    <p:tnLst>
+      <p:par>
+        <p:cTn id="1" dur="indefinite" restart="never" nodeType="tmRoot"/>
+      </p:par>
+    </p:tnLst>
+  </p:timing>
 </p:sld>
 </file>
 
@@ -7024,6 +7043,13 @@
   <p:clrMapOvr>
     <a:masterClrMapping/>
   </p:clrMapOvr>
+  <p:timing>
+    <p:tnLst>
+      <p:par>
+        <p:cTn id="1" dur="indefinite" restart="never" nodeType="tmRoot"/>
+      </p:par>
+    </p:tnLst>
+  </p:timing>
 </p:sld>
 </file>
 
@@ -7180,6 +7206,13 @@
   <p:clrMapOvr>
     <a:masterClrMapping/>
   </p:clrMapOvr>
+  <p:timing>
+    <p:tnLst>
+      <p:par>
+        <p:cTn id="1" dur="indefinite" restart="never" nodeType="tmRoot"/>
+      </p:par>
+    </p:tnLst>
+  </p:timing>
 </p:sld>
 </file>
 
@@ -7319,6 +7352,13 @@
   <p:clrMapOvr>
     <a:masterClrMapping/>
   </p:clrMapOvr>
+  <p:timing>
+    <p:tnLst>
+      <p:par>
+        <p:cTn id="1" dur="indefinite" restart="never" nodeType="tmRoot"/>
+      </p:par>
+    </p:tnLst>
+  </p:timing>
 </p:sld>
 </file>
 
@@ -7458,6 +7498,13 @@
   <p:clrMapOvr>
     <a:masterClrMapping/>
   </p:clrMapOvr>
+  <p:timing>
+    <p:tnLst>
+      <p:par>
+        <p:cTn id="1" dur="indefinite" restart="never" nodeType="tmRoot"/>
+      </p:par>
+    </p:tnLst>
+  </p:timing>
 </p:sld>
 </file>
 
@@ -7602,6 +7649,13 @@
   <p:clrMapOvr>
     <a:masterClrMapping/>
   </p:clrMapOvr>
+  <p:timing>
+    <p:tnLst>
+      <p:par>
+        <p:cTn id="1" dur="indefinite" restart="never" nodeType="tmRoot"/>
+      </p:par>
+    </p:tnLst>
+  </p:timing>
 </p:sld>
 </file>
 
@@ -7733,6 +7787,13 @@
   <p:clrMapOvr>
     <a:masterClrMapping/>
   </p:clrMapOvr>
+  <p:timing>
+    <p:tnLst>
+      <p:par>
+        <p:cTn id="1" dur="indefinite" restart="never" nodeType="tmRoot"/>
+      </p:par>
+    </p:tnLst>
+  </p:timing>
 </p:sld>
 </file>
 

</xml_diff>